<commit_message>
Cleans up some slides
</commit_message>
<xml_diff>
--- a/presentations/Session_4_Advanced_Boot.pptx
+++ b/presentations/Session_4_Advanced_Boot.pptx
@@ -139,7 +139,7 @@
       </p14:sectionLst>
     </p:ext>
     <p:ext uri="{EFAFB233-063F-42B5-8137-9DF3F51BA10A}">
-      <p15:sldGuideLst xmlns:p15="http://schemas.microsoft.com/office/powerpoint/2012/main" xmlns="">
+      <p15:sldGuideLst xmlns:p15="http://schemas.microsoft.com/office/powerpoint/2012/main">
         <p15:guide id="1" orient="horz" pos="1620">
           <p15:clr>
             <a:srgbClr val="A4A3A4"/>
@@ -238,7 +238,7 @@
           <a:p>
             <a:fld id="{372E5B6B-8713-8747-AE5B-F1241B2BF5F0}" type="datetimeFigureOut">
               <a:rPr lang="en-US" smtClean="0"/>
-              <a:t>11/1/17</a:t>
+              <a:t>7/18/18</a:t>
             </a:fld>
             <a:endParaRPr lang="en-US"/>
           </a:p>
@@ -404,7 +404,7 @@
           <a:p>
             <a:fld id="{7E7B7340-DDD5-1B49-81AA-25BC4050C073}" type="datetimeFigureOut">
               <a:rPr lang="en-US" smtClean="0"/>
-              <a:t>11/1/17</a:t>
+              <a:t>7/18/18</a:t>
             </a:fld>
             <a:endParaRPr lang="en-US"/>
           </a:p>
@@ -468,38 +468,37 @@
           <a:p>
             <a:pPr lvl="0"/>
             <a:r>
-              <a:rPr lang="en-US" smtClean="0"/>
+              <a:rPr lang="en-US"/>
               <a:t>Click to edit Master text styles</a:t>
             </a:r>
           </a:p>
           <a:p>
             <a:pPr lvl="1"/>
             <a:r>
-              <a:rPr lang="en-US" smtClean="0"/>
+              <a:rPr lang="en-US"/>
               <a:t>Second level</a:t>
             </a:r>
           </a:p>
           <a:p>
             <a:pPr lvl="2"/>
             <a:r>
-              <a:rPr lang="en-US" smtClean="0"/>
+              <a:rPr lang="en-US"/>
               <a:t>Third level</a:t>
             </a:r>
           </a:p>
           <a:p>
             <a:pPr lvl="3"/>
             <a:r>
-              <a:rPr lang="en-US" smtClean="0"/>
+              <a:rPr lang="en-US"/>
               <a:t>Fourth level</a:t>
             </a:r>
           </a:p>
           <a:p>
             <a:pPr lvl="4"/>
             <a:r>
-              <a:rPr lang="en-US" smtClean="0"/>
+              <a:rPr lang="en-US"/>
               <a:t>Fifth level</a:t>
             </a:r>
-            <a:endParaRPr lang="en-US"/>
           </a:p>
         </p:txBody>
       </p:sp>
@@ -718,11 +717,11 @@
           <a:lstStyle/>
           <a:p>
             <a:r>
-              <a:rPr lang="en-US" dirty="0" smtClean="0"/>
+              <a:rPr lang="en-US" dirty="0"/>
               <a:t>Resting slide</a:t>
             </a:r>
             <a:r>
-              <a:rPr lang="en-US" baseline="0" dirty="0" smtClean="0"/>
+              <a:rPr lang="en-US" baseline="0" dirty="0"/>
               <a:t> on screen before you begin presenting.</a:t>
             </a:r>
             <a:endParaRPr lang="en-US" dirty="0"/>
@@ -810,28 +809,28 @@
           <a:lstStyle/>
           <a:p>
             <a:r>
-              <a:rPr lang="en-US" dirty="0" smtClean="0"/>
+              <a:rPr lang="en-US" dirty="0"/>
               <a:t>Actuators</a:t>
             </a:r>
             <a:r>
-              <a:rPr lang="en-US" baseline="0" dirty="0" smtClean="0"/>
+              <a:rPr lang="en-US" baseline="0" dirty="0"/>
               <a:t> enable production-ready features to a Spring Boot application – without having to actually implement them yourself</a:t>
             </a:r>
           </a:p>
           <a:p>
-            <a:endParaRPr lang="en-US" baseline="0" dirty="0" smtClean="0"/>
+            <a:endParaRPr lang="en-US" baseline="0" dirty="0"/>
           </a:p>
           <a:p>
             <a:r>
-              <a:rPr lang="en-US" baseline="0" dirty="0" smtClean="0"/>
+              <a:rPr lang="en-US" baseline="0" dirty="0"/>
               <a:t>They’re mainly used to expose different types of information about the running application – health, metrics, info, dump, </a:t>
             </a:r>
             <a:r>
-              <a:rPr lang="en-US" baseline="0" dirty="0" err="1" smtClean="0"/>
+              <a:rPr lang="en-US" baseline="0" dirty="0" err="1"/>
               <a:t>env</a:t>
             </a:r>
             <a:r>
-              <a:rPr lang="en-US" baseline="0" dirty="0" smtClean="0"/>
+              <a:rPr lang="en-US" baseline="0" dirty="0"/>
               <a:t> etc.. And while these are no replacement for production-grade monitoring solution –they’re a very good starting point</a:t>
             </a:r>
             <a:endParaRPr lang="en-US" dirty="0"/>
@@ -923,7 +922,7 @@
               <a:buChar char="•"/>
             </a:pPr>
             <a:r>
-              <a:rPr lang="en-US" dirty="0" smtClean="0"/>
+              <a:rPr lang="en-US" dirty="0"/>
               <a:t>Actuator endpoints allow you to monitor and interact with your application. Spring Boot includes a number of built-in endpoints and you can also add your own. For example the health endpoint provides basic application health information.</a:t>
             </a:r>
           </a:p>
@@ -932,7 +931,7 @@
               <a:buFont typeface="Arial"/>
               <a:buChar char="•"/>
             </a:pPr>
-            <a:endParaRPr lang="en-US" dirty="0" smtClean="0"/>
+            <a:endParaRPr lang="en-US" dirty="0"/>
           </a:p>
           <a:p>
             <a:pPr marL="171450" indent="-171450">
@@ -940,10 +939,9 @@
               <a:buChar char="•"/>
             </a:pPr>
             <a:r>
-              <a:rPr lang="en-US" dirty="0" smtClean="0"/>
+              <a:rPr lang="en-US" dirty="0"/>
               <a:t>The way that endpoints are exposed will depend on the type of technology that you choose. Most applications choose HTTP monitoring, where the ID of the endpoint is mapped to a URL. For example, by default, the health endpoint will be mapped to /health</a:t>
             </a:r>
-            <a:endParaRPr lang="en-US" dirty="0"/>
           </a:p>
         </p:txBody>
       </p:sp>
@@ -1028,20 +1026,20 @@
           <a:lstStyle/>
           <a:p>
             <a:r>
-              <a:rPr lang="en-US" dirty="0" smtClean="0"/>
+              <a:rPr lang="en-US" dirty="0"/>
               <a:t>Here</a:t>
             </a:r>
             <a:r>
-              <a:rPr lang="en-US" baseline="0" dirty="0" smtClean="0"/>
+              <a:rPr lang="en-US" baseline="0" dirty="0"/>
               <a:t> we provide the example of the “/health” endpoint as noted in the URL location bar</a:t>
             </a:r>
           </a:p>
           <a:p>
-            <a:endParaRPr lang="en-US" baseline="0" dirty="0" smtClean="0"/>
+            <a:endParaRPr lang="en-US" baseline="0" dirty="0"/>
           </a:p>
           <a:p>
             <a:r>
-              <a:rPr lang="en-US" baseline="0" dirty="0" smtClean="0"/>
+              <a:rPr lang="en-US" baseline="0" dirty="0"/>
               <a:t>There are a number of endpoints exposed by the Actuator, during lab please explore each one</a:t>
             </a:r>
             <a:endParaRPr lang="en-US" dirty="0"/>
@@ -1129,58 +1127,58 @@
           <a:lstStyle/>
           <a:p>
             <a:r>
-              <a:rPr lang="en-US" dirty="0" smtClean="0"/>
+              <a:rPr lang="en-US" dirty="0"/>
               <a:t>Additionally</a:t>
             </a:r>
             <a:r>
-              <a:rPr lang="en-US" baseline="0" dirty="0" smtClean="0"/>
+              <a:rPr lang="en-US" baseline="0" dirty="0"/>
               <a:t> these health indicators, some for backing services, are auto-configured by Spring Boot when appropriate</a:t>
             </a:r>
           </a:p>
           <a:p>
-            <a:endParaRPr lang="en-US" baseline="0" dirty="0" smtClean="0"/>
+            <a:endParaRPr lang="en-US" baseline="0" dirty="0"/>
           </a:p>
           <a:p>
             <a:r>
-              <a:rPr lang="en-US" baseline="0" dirty="0" smtClean="0"/>
+              <a:rPr lang="en-US" baseline="0" dirty="0"/>
               <a:t>Information returned by </a:t>
             </a:r>
             <a:r>
-              <a:rPr lang="en-US" baseline="0" dirty="0" err="1" smtClean="0"/>
+              <a:rPr lang="en-US" baseline="0" dirty="0" err="1"/>
               <a:t>HealthIndicators</a:t>
             </a:r>
             <a:r>
-              <a:rPr lang="en-US" baseline="0" dirty="0" smtClean="0"/>
+              <a:rPr lang="en-US" baseline="0" dirty="0"/>
               <a:t> is often somewhat sensitive in nature. For example, you probably don’t want to publish details of your database server to the world. For this reason, by default, only the health status is exposed over an unauthenticated HTTP connection. If you are happy for complete health information to always be exposed you can set </a:t>
             </a:r>
             <a:r>
-              <a:rPr lang="en-US" baseline="0" dirty="0" err="1" smtClean="0"/>
+              <a:rPr lang="en-US" baseline="0" dirty="0" err="1"/>
               <a:t>endpoints.health.sensitive</a:t>
             </a:r>
             <a:r>
-              <a:rPr lang="en-US" baseline="0" dirty="0" smtClean="0"/>
+              <a:rPr lang="en-US" baseline="0" dirty="0"/>
               <a:t> to false.</a:t>
             </a:r>
           </a:p>
           <a:p>
-            <a:endParaRPr lang="en-US" baseline="0" dirty="0" smtClean="0"/>
+            <a:endParaRPr lang="en-US" baseline="0" dirty="0"/>
           </a:p>
           <a:p>
             <a:r>
-              <a:rPr lang="en-US" baseline="0" dirty="0" smtClean="0"/>
+              <a:rPr lang="en-US" baseline="0" dirty="0"/>
               <a:t>Health responses are also cached to prevent “denial of service” attacks. Use the </a:t>
             </a:r>
             <a:r>
-              <a:rPr lang="en-US" baseline="0" dirty="0" err="1" smtClean="0"/>
+              <a:rPr lang="en-US" baseline="0" dirty="0" err="1"/>
               <a:t>endpoints.health.time</a:t>
             </a:r>
             <a:r>
-              <a:rPr lang="en-US" baseline="0" dirty="0" smtClean="0"/>
+              <a:rPr lang="en-US" baseline="0" dirty="0"/>
               <a:t>-to-live property if you want to change the default cache period of 1000 milliseconds.</a:t>
             </a:r>
           </a:p>
           <a:p>
-            <a:endParaRPr lang="en-US" baseline="0" dirty="0" smtClean="0"/>
+            <a:endParaRPr lang="en-US" baseline="0" dirty="0"/>
           </a:p>
           <a:p>
             <a:endParaRPr lang="en-US" dirty="0"/>
@@ -1272,7 +1270,7 @@
               <a:buChar char="•"/>
             </a:pPr>
             <a:r>
-              <a:rPr lang="en-US" dirty="0" smtClean="0"/>
+              <a:rPr lang="en-US" dirty="0"/>
               <a:t>The management endpoints are secure even if the application endpoints are insecure.</a:t>
             </a:r>
           </a:p>
@@ -1282,23 +1280,23 @@
               <a:buChar char="•"/>
             </a:pPr>
             <a:r>
-              <a:rPr lang="en-US" dirty="0" smtClean="0"/>
+              <a:rPr lang="en-US" dirty="0"/>
               <a:t>Security events are transformed into </a:t>
             </a:r>
             <a:r>
-              <a:rPr lang="en-US" dirty="0" err="1" smtClean="0"/>
+              <a:rPr lang="en-US" dirty="0" err="1"/>
               <a:t>AuditEvents</a:t>
             </a:r>
             <a:r>
-              <a:rPr lang="en-US" dirty="0" smtClean="0"/>
+              <a:rPr lang="en-US" dirty="0"/>
               <a:t> and published to the </a:t>
             </a:r>
             <a:r>
-              <a:rPr lang="en-US" dirty="0" err="1" smtClean="0"/>
+              <a:rPr lang="en-US" dirty="0" err="1"/>
               <a:t>AuditService</a:t>
             </a:r>
             <a:r>
-              <a:rPr lang="en-US" dirty="0" smtClean="0"/>
+              <a:rPr lang="en-US" dirty="0"/>
               <a:t>.</a:t>
             </a:r>
           </a:p>
@@ -1308,10 +1306,9 @@
               <a:buChar char="•"/>
             </a:pPr>
             <a:r>
-              <a:rPr lang="en-US" dirty="0" smtClean="0"/>
+              <a:rPr lang="en-US" dirty="0"/>
               <a:t>The default user will have the ADMIN role as well as the USER role.</a:t>
             </a:r>
-            <a:endParaRPr lang="en-US" dirty="0"/>
           </a:p>
         </p:txBody>
       </p:sp>
@@ -1400,23 +1397,23 @@
               <a:buChar char="•"/>
             </a:pPr>
             <a:r>
-              <a:rPr lang="en-US" sz="1200" dirty="0" smtClean="0"/>
+              <a:rPr lang="en-US" sz="1200" dirty="0"/>
               <a:t>A ‘gauge’ records a single value; and a ‘counter’ records a delta (an increment or decrement). Spring Boot Actuator also provides a </a:t>
             </a:r>
             <a:r>
-              <a:rPr lang="en-US" sz="1200" dirty="0" err="1" smtClean="0"/>
+              <a:rPr lang="en-US" sz="1200" dirty="0" err="1"/>
               <a:t>PublicMetrics</a:t>
             </a:r>
             <a:r>
-              <a:rPr lang="en-US" sz="1200" dirty="0" smtClean="0"/>
+              <a:rPr lang="en-US" sz="1200" dirty="0"/>
               <a:t> interface that you can implement to expose metrics that you cannot record via one of those two mechanisms. Look at </a:t>
             </a:r>
             <a:r>
-              <a:rPr lang="en-US" sz="1200" dirty="0" err="1" smtClean="0"/>
+              <a:rPr lang="en-US" sz="1200" dirty="0" err="1"/>
               <a:t>SystemPublicMetrics</a:t>
             </a:r>
             <a:r>
-              <a:rPr lang="en-US" sz="1200" dirty="0" smtClean="0"/>
+              <a:rPr lang="en-US" sz="1200" dirty="0"/>
               <a:t> for an example.</a:t>
             </a:r>
           </a:p>
@@ -1425,7 +1422,7 @@
               <a:buFont typeface="Arial"/>
               <a:buChar char="•"/>
             </a:pPr>
-            <a:endParaRPr lang="en-US" sz="1200" dirty="0" smtClean="0"/>
+            <a:endParaRPr lang="en-US" sz="1200" dirty="0"/>
           </a:p>
           <a:p>
             <a:pPr marL="171450" indent="-171450">
@@ -1433,7 +1430,7 @@
               <a:buChar char="•"/>
             </a:pPr>
             <a:r>
-              <a:rPr lang="en-US" sz="1200" dirty="0" smtClean="0"/>
+              <a:rPr lang="en-US" sz="1200" dirty="0"/>
               <a:t>Metrics for all HTTP requests are automatically recorded, so if you hit the metrics endpoint you should see a response similar to this:</a:t>
             </a:r>
             <a:endParaRPr lang="en-US" dirty="0"/>
@@ -1521,53 +1518,53 @@
           <a:lstStyle/>
           <a:p>
             <a:r>
-              <a:rPr lang="en-US" dirty="0" smtClean="0"/>
+              <a:rPr lang="en-US" dirty="0"/>
               <a:t>If one wants to set the active Spring</a:t>
             </a:r>
             <a:r>
-              <a:rPr lang="en-US" baseline="0" dirty="0" smtClean="0"/>
+              <a:rPr lang="en-US" baseline="0" dirty="0"/>
               <a:t> profiles</a:t>
             </a:r>
           </a:p>
           <a:p>
-            <a:endParaRPr lang="en-US" baseline="0" dirty="0" smtClean="0"/>
+            <a:endParaRPr lang="en-US" baseline="0" dirty="0"/>
           </a:p>
           <a:p>
             <a:r>
-              <a:rPr lang="en-US" baseline="0" dirty="0" smtClean="0"/>
+              <a:rPr lang="en-US" baseline="0" dirty="0"/>
               <a:t>The Spring Environment has an API for this, but normally one would set either a </a:t>
             </a:r>
             <a:r>
-              <a:rPr lang="en-US" baseline="0" dirty="0" err="1" smtClean="0"/>
+              <a:rPr lang="en-US" baseline="0" dirty="0" err="1"/>
               <a:t>System.property</a:t>
             </a:r>
             <a:r>
-              <a:rPr lang="en-US" baseline="0" dirty="0" smtClean="0"/>
+              <a:rPr lang="en-US" baseline="0" dirty="0"/>
               <a:t>, or an OS environment variable or it can be set in the </a:t>
             </a:r>
             <a:r>
-              <a:rPr lang="en-US" baseline="0" dirty="0" err="1" smtClean="0"/>
+              <a:rPr lang="en-US" baseline="0" dirty="0" err="1"/>
               <a:t>application.properties</a:t>
             </a:r>
             <a:r>
-              <a:rPr lang="en-US" baseline="0" dirty="0" smtClean="0"/>
+              <a:rPr lang="en-US" baseline="0" dirty="0"/>
               <a:t> (or </a:t>
             </a:r>
             <a:r>
-              <a:rPr lang="en-US" baseline="0" dirty="0" err="1" smtClean="0"/>
+              <a:rPr lang="en-US" baseline="0" dirty="0" err="1"/>
               <a:t>application.yml</a:t>
             </a:r>
             <a:r>
-              <a:rPr lang="en-US" baseline="0" dirty="0" smtClean="0"/>
+              <a:rPr lang="en-US" baseline="0" dirty="0"/>
               <a:t>) file</a:t>
             </a:r>
           </a:p>
           <a:p>
-            <a:endParaRPr lang="en-US" baseline="0" dirty="0" smtClean="0"/>
+            <a:endParaRPr lang="en-US" baseline="0" dirty="0"/>
           </a:p>
           <a:p>
             <a:r>
-              <a:rPr lang="en-US" baseline="0" dirty="0" smtClean="0"/>
+              <a:rPr lang="en-US" baseline="0" dirty="0"/>
               <a:t>The YAML documents are merged in the order they are encountered (so later values override earlier ones)</a:t>
             </a:r>
           </a:p>
@@ -2313,7 +2310,7 @@
   <p:clrMapOvr>
     <a:masterClrMapping/>
   </p:clrMapOvr>
-  <p:transition xmlns:p14="http://schemas.microsoft.com/office/powerpoint/2010/main" spd="med"/>
+  <p:transition spd="med"/>
 </p:sldLayout>
 </file>
 
@@ -2541,10 +2538,9 @@
           </a:lstStyle>
           <a:p>
             <a:r>
-              <a:rPr lang="en-US" dirty="0" smtClean="0"/>
+              <a:rPr lang="en-US" dirty="0"/>
               <a:t>CLICK TO EDIT MASTER TITLE STYLE</a:t>
             </a:r>
-            <a:endParaRPr lang="en-US" dirty="0"/>
           </a:p>
         </p:txBody>
       </p:sp>
@@ -2619,35 +2615,35 @@
           <a:p>
             <a:pPr lvl="0"/>
             <a:r>
-              <a:rPr lang="en-US" smtClean="0"/>
+              <a:rPr lang="en-US"/>
               <a:t>Click to edit Master text styles</a:t>
             </a:r>
           </a:p>
           <a:p>
             <a:pPr lvl="1"/>
             <a:r>
-              <a:rPr lang="en-US" smtClean="0"/>
+              <a:rPr lang="en-US"/>
               <a:t>Second level</a:t>
             </a:r>
           </a:p>
           <a:p>
             <a:pPr lvl="2"/>
             <a:r>
-              <a:rPr lang="en-US" smtClean="0"/>
+              <a:rPr lang="en-US"/>
               <a:t>Third level</a:t>
             </a:r>
           </a:p>
           <a:p>
             <a:pPr lvl="3"/>
             <a:r>
-              <a:rPr lang="en-US" smtClean="0"/>
+              <a:rPr lang="en-US"/>
               <a:t>Fourth level</a:t>
             </a:r>
           </a:p>
           <a:p>
             <a:pPr lvl="4"/>
             <a:r>
-              <a:rPr lang="en-US" smtClean="0"/>
+              <a:rPr lang="en-US"/>
               <a:t>Fifth level</a:t>
             </a:r>
             <a:endParaRPr lang="en-US" dirty="0"/>
@@ -2726,7 +2722,7 @@
           <a:p>
             <a:pPr algn="l"/>
             <a:r>
-              <a:rPr lang="en-US" sz="600" dirty="0" smtClean="0">
+              <a:rPr lang="en-US" sz="600" dirty="0">
                 <a:solidFill>
                   <a:schemeClr val="bg1">
                     <a:lumMod val="50000"/>
@@ -2738,7 +2734,7 @@
               <a:t>© Copyright 2015 Pivotal.</a:t>
             </a:r>
             <a:r>
-              <a:rPr lang="en-US" sz="600" baseline="0" dirty="0" smtClean="0">
+              <a:rPr lang="en-US" sz="600" baseline="0" dirty="0">
                 <a:solidFill>
                   <a:schemeClr val="bg1">
                     <a:lumMod val="50000"/>
@@ -2750,7 +2746,7 @@
               <a:t> </a:t>
             </a:r>
             <a:r>
-              <a:rPr lang="en-US" sz="600" dirty="0" smtClean="0">
+              <a:rPr lang="en-US" sz="600" dirty="0">
                 <a:solidFill>
                   <a:schemeClr val="bg1">
                     <a:lumMod val="50000"/>
@@ -2761,15 +2757,6 @@
               </a:rPr>
               <a:t>All rights reserved.</a:t>
             </a:r>
-            <a:endParaRPr lang="en-US" sz="600" dirty="0">
-              <a:solidFill>
-                <a:schemeClr val="bg1">
-                  <a:lumMod val="50000"/>
-                </a:schemeClr>
-              </a:solidFill>
-              <a:latin typeface="Arial"/>
-              <a:cs typeface="Arial"/>
-            </a:endParaRPr>
           </a:p>
         </p:txBody>
       </p:sp>
@@ -2842,13 +2829,6 @@
   <p:clrMapOvr>
     <a:masterClrMapping/>
   </p:clrMapOvr>
-  <p:timing>
-    <p:tnLst>
-      <p:par>
-        <p:cTn xmlns:p14="http://schemas.microsoft.com/office/powerpoint/2010/main" id="1" dur="indefinite" restart="never" nodeType="tmRoot"/>
-      </p:par>
-    </p:tnLst>
-  </p:timing>
 </p:sldLayout>
 </file>
 
@@ -3204,10 +3184,9 @@
           </a:lstStyle>
           <a:p>
             <a:r>
-              <a:rPr lang="en-US" dirty="0" smtClean="0"/>
+              <a:rPr lang="en-US" dirty="0"/>
               <a:t>Click to edit Master title style</a:t>
             </a:r>
-            <a:endParaRPr lang="en-US" dirty="0"/>
           </a:p>
         </p:txBody>
       </p:sp>
@@ -3303,10 +3282,9 @@
           <a:p>
             <a:pPr lvl="0"/>
             <a:r>
-              <a:rPr lang="en-US" dirty="0" smtClean="0"/>
+              <a:rPr lang="en-US" dirty="0"/>
               <a:t>Click to edit Master</a:t>
             </a:r>
-            <a:endParaRPr lang="en-US" dirty="0"/>
           </a:p>
         </p:txBody>
       </p:sp>
@@ -3370,13 +3348,6 @@
   <p:clrMapOvr>
     <a:masterClrMapping/>
   </p:clrMapOvr>
-  <p:timing>
-    <p:tnLst>
-      <p:par>
-        <p:cTn xmlns:p14="http://schemas.microsoft.com/office/powerpoint/2010/main" id="1" dur="indefinite" restart="never" nodeType="tmRoot"/>
-      </p:par>
-    </p:tnLst>
-  </p:timing>
 </p:sldLayout>
 </file>
 
@@ -3548,13 +3519,6 @@
   <p:clrMapOvr>
     <a:masterClrMapping/>
   </p:clrMapOvr>
-  <p:timing>
-    <p:tnLst>
-      <p:par>
-        <p:cTn xmlns:p14="http://schemas.microsoft.com/office/powerpoint/2010/main" id="1" dur="indefinite" restart="never" nodeType="tmRoot"/>
-      </p:par>
-    </p:tnLst>
-  </p:timing>
 </p:sldLayout>
 </file>
 
@@ -3641,13 +3605,6 @@
   <p:clrMapOvr>
     <a:masterClrMapping/>
   </p:clrMapOvr>
-  <p:timing>
-    <p:tnLst>
-      <p:par>
-        <p:cTn xmlns:p14="http://schemas.microsoft.com/office/powerpoint/2010/main" id="1" dur="indefinite" restart="never" nodeType="tmRoot"/>
-      </p:par>
-    </p:tnLst>
-  </p:timing>
 </p:sldLayout>
 </file>
 
@@ -3706,10 +3663,9 @@
           </a:lstStyle>
           <a:p>
             <a:r>
-              <a:rPr lang="en-US" dirty="0" smtClean="0"/>
+              <a:rPr lang="en-US" dirty="0"/>
               <a:t>Click to Edit Master Title Style</a:t>
             </a:r>
-            <a:endParaRPr lang="en-US" dirty="0"/>
           </a:p>
         </p:txBody>
       </p:sp>
@@ -3723,16 +3679,9 @@
   <p:clrMapOvr>
     <a:masterClrMapping/>
   </p:clrMapOvr>
-  <p:transition xmlns:p14="http://schemas.microsoft.com/office/powerpoint/2010/main">
+  <p:transition>
     <p:fade/>
   </p:transition>
-  <p:timing>
-    <p:tnLst>
-      <p:par>
-        <p:cTn xmlns:p14="http://schemas.microsoft.com/office/powerpoint/2010/main" id="1" dur="indefinite" restart="never" nodeType="tmRoot"/>
-      </p:par>
-    </p:tnLst>
-  </p:timing>
 </p:sldLayout>
 </file>
 
@@ -4192,7 +4141,7 @@
   <p:clrMapOvr>
     <a:masterClrMapping/>
   </p:clrMapOvr>
-  <p:transition xmlns:p14="http://schemas.microsoft.com/office/powerpoint/2010/main" spd="med"/>
+  <p:transition spd="med"/>
 </p:sldLayout>
 </file>
 
@@ -5119,10 +5068,9 @@
           </a:lstStyle>
           <a:p>
             <a:r>
-              <a:rPr lang="en-US" dirty="0" smtClean="0"/>
+              <a:rPr lang="en-US" dirty="0"/>
               <a:t>Click to edit Master title style</a:t>
             </a:r>
-            <a:endParaRPr lang="en-US" dirty="0"/>
           </a:p>
         </p:txBody>
       </p:sp>
@@ -5218,10 +5166,9 @@
           <a:p>
             <a:pPr lvl="0"/>
             <a:r>
-              <a:rPr lang="en-US" dirty="0" smtClean="0"/>
+              <a:rPr lang="en-US" dirty="0"/>
               <a:t>Click to edit Master</a:t>
             </a:r>
-            <a:endParaRPr lang="en-US" dirty="0"/>
           </a:p>
         </p:txBody>
       </p:sp>
@@ -5235,13 +5182,6 @@
   <p:clrMapOvr>
     <a:masterClrMapping/>
   </p:clrMapOvr>
-  <p:timing>
-    <p:tnLst>
-      <p:par>
-        <p:cTn xmlns:p14="http://schemas.microsoft.com/office/powerpoint/2010/main" id="1" dur="indefinite" restart="never" nodeType="tmRoot"/>
-      </p:par>
-    </p:tnLst>
-  </p:timing>
 </p:sldLayout>
 </file>
 
@@ -5413,13 +5353,6 @@
   <p:clrMapOvr>
     <a:masterClrMapping/>
   </p:clrMapOvr>
-  <p:timing>
-    <p:tnLst>
-      <p:par>
-        <p:cTn xmlns:p14="http://schemas.microsoft.com/office/powerpoint/2010/main" id="1" dur="indefinite" restart="never" nodeType="tmRoot"/>
-      </p:par>
-    </p:tnLst>
-  </p:timing>
 </p:sldLayout>
 </file>
 
@@ -5506,13 +5439,6 @@
   <p:clrMapOvr>
     <a:masterClrMapping/>
   </p:clrMapOvr>
-  <p:timing>
-    <p:tnLst>
-      <p:par>
-        <p:cTn xmlns:p14="http://schemas.microsoft.com/office/powerpoint/2010/main" id="1" dur="indefinite" restart="never" nodeType="tmRoot"/>
-      </p:par>
-    </p:tnLst>
-  </p:timing>
 </p:sldLayout>
 </file>
 
@@ -5571,10 +5497,9 @@
           </a:lstStyle>
           <a:p>
             <a:r>
-              <a:rPr lang="en-US" dirty="0" smtClean="0"/>
+              <a:rPr lang="en-US" dirty="0"/>
               <a:t>Click to Edit Master Title Style</a:t>
             </a:r>
-            <a:endParaRPr lang="en-US" dirty="0"/>
           </a:p>
         </p:txBody>
       </p:sp>
@@ -5588,16 +5513,9 @@
   <p:clrMapOvr>
     <a:masterClrMapping/>
   </p:clrMapOvr>
-  <p:transition xmlns:p14="http://schemas.microsoft.com/office/powerpoint/2010/main">
+  <p:transition>
     <p:fade/>
   </p:transition>
-  <p:timing>
-    <p:tnLst>
-      <p:par>
-        <p:cTn xmlns:p14="http://schemas.microsoft.com/office/powerpoint/2010/main" id="1" dur="indefinite" restart="never" nodeType="tmRoot"/>
-      </p:par>
-    </p:tnLst>
-  </p:timing>
 </p:sldLayout>
 </file>
 
@@ -6970,13 +6888,6 @@
     <p:sldLayoutId id="2147483734" r:id="rId8"/>
     <p:sldLayoutId id="2147483735" r:id="rId9"/>
   </p:sldLayoutIdLst>
-  <p:timing>
-    <p:tnLst>
-      <p:par>
-        <p:cTn xmlns:p14="http://schemas.microsoft.com/office/powerpoint/2010/main" id="1" dur="indefinite" restart="never" nodeType="tmRoot"/>
-      </p:par>
-    </p:tnLst>
-  </p:timing>
   <p:hf hdr="0" ftr="0" dt="0"/>
   <p:txStyles>
     <p:titleStyle>
@@ -7303,13 +7214,6 @@
     <p:sldLayoutId id="2147483730" r:id="rId6"/>
     <p:sldLayoutId id="2147483731" r:id="rId7"/>
   </p:sldLayoutIdLst>
-  <p:timing>
-    <p:tnLst>
-      <p:par>
-        <p:cTn xmlns:p14="http://schemas.microsoft.com/office/powerpoint/2010/main" id="1" dur="indefinite" restart="never" nodeType="tmRoot"/>
-      </p:par>
-    </p:tnLst>
-  </p:timing>
   <p:hf hdr="0" ftr="0" dt="0"/>
   <p:txStyles>
     <p:titleStyle>
@@ -7722,7 +7626,7 @@
               </a:spcAft>
             </a:pPr>
             <a:r>
-              <a:rPr lang="en-US" sz="4200" b="1" spc="-100" dirty="0" smtClean="0">
+              <a:rPr lang="en-US" sz="4200" b="1" spc="-100" dirty="0">
                 <a:solidFill>
                   <a:srgbClr val="00AE9E"/>
                 </a:solidFill>
@@ -7779,7 +7683,7 @@
               </a:spcAft>
             </a:pPr>
             <a:r>
-              <a:rPr lang="en-US" sz="2800" spc="-100" dirty="0" smtClean="0">
+              <a:rPr lang="en-US" sz="2800" spc="-100" dirty="0">
                 <a:solidFill>
                   <a:schemeClr val="bg1"/>
                 </a:solidFill>
@@ -7794,19 +7698,6 @@
               </a:rPr>
               <a:t>Advancing Spring Boot with Actuator and Profiles</a:t>
             </a:r>
-            <a:endParaRPr lang="en-US" sz="2800" spc="-100" dirty="0">
-              <a:solidFill>
-                <a:schemeClr val="bg1"/>
-              </a:solidFill>
-              <a:effectLst>
-                <a:outerShdw blurRad="50800" dist="38100" dir="5400000" algn="t" rotWithShape="0">
-                  <a:prstClr val="black">
-                    <a:alpha val="40000"/>
-                  </a:prstClr>
-                </a:outerShdw>
-              </a:effectLst>
-              <a:cs typeface="Arial"/>
-            </a:endParaRPr>
           </a:p>
         </p:txBody>
       </p:sp>
@@ -7820,13 +7711,6 @@
   <p:clrMapOvr>
     <a:masterClrMapping/>
   </p:clrMapOvr>
-  <p:timing>
-    <p:tnLst>
-      <p:par>
-        <p:cTn xmlns:p14="http://schemas.microsoft.com/office/powerpoint/2010/main" id="1" dur="indefinite" restart="never" nodeType="tmRoot"/>
-      </p:par>
-    </p:tnLst>
-  </p:timing>
 </p:sld>
 </file>
 
@@ -7863,7 +7747,7 @@
           <a:lstStyle/>
           <a:p>
             <a:r>
-              <a:rPr lang="en-US" dirty="0" smtClean="0"/>
+              <a:rPr lang="en-US" dirty="0"/>
               <a:t>Getting Started</a:t>
             </a:r>
             <a:endParaRPr lang="en-US" dirty="0">
@@ -7900,13 +7784,13 @@
               <a:buNone/>
             </a:pPr>
             <a:r>
-              <a:rPr lang="en-US" sz="1400" dirty="0" smtClean="0"/>
+              <a:rPr lang="en-US" sz="1400" dirty="0"/>
               <a:t>Actuator</a:t>
             </a:r>
           </a:p>
           <a:p>
             <a:r>
-              <a:rPr lang="en-US" sz="1400" dirty="0" smtClean="0">
+              <a:rPr lang="en-US" sz="1400" dirty="0">
                 <a:solidFill>
                   <a:srgbClr val="FFFFFF"/>
                 </a:solidFill>
@@ -7917,7 +7801,7 @@
           <a:p>
             <a:pPr lvl="1"/>
             <a:r>
-              <a:rPr lang="en-US" sz="1200" dirty="0" smtClean="0">
+              <a:rPr lang="en-US" sz="1200" dirty="0">
                 <a:solidFill>
                   <a:srgbClr val="FFFFFF"/>
                 </a:solidFill>
@@ -7928,7 +7812,7 @@
           <a:p>
             <a:pPr lvl="1"/>
             <a:r>
-              <a:rPr lang="en-US" sz="1200" dirty="0" smtClean="0">
+              <a:rPr lang="en-US" sz="1200" dirty="0">
                 <a:solidFill>
                   <a:srgbClr val="FFFFFF"/>
                 </a:solidFill>
@@ -7939,7 +7823,7 @@
           <a:p>
             <a:pPr lvl="1"/>
             <a:r>
-              <a:rPr lang="en-US" sz="1200" dirty="0" smtClean="0">
+              <a:rPr lang="en-US" sz="1200" dirty="0">
                 <a:solidFill>
                   <a:srgbClr val="FFFFFF"/>
                 </a:solidFill>
@@ -7950,7 +7834,7 @@
           <a:p>
             <a:pPr lvl="1"/>
             <a:r>
-              <a:rPr lang="en-US" sz="1200" dirty="0" smtClean="0">
+              <a:rPr lang="en-US" sz="1200" dirty="0">
                 <a:solidFill>
                   <a:srgbClr val="FFFFFF"/>
                 </a:solidFill>
@@ -7961,7 +7845,7 @@
           <a:p>
             <a:pPr lvl="1"/>
             <a:r>
-              <a:rPr lang="en-US" sz="1200" dirty="0" smtClean="0">
+              <a:rPr lang="en-US" sz="1200" dirty="0">
                 <a:solidFill>
                   <a:srgbClr val="FFFFFF"/>
                 </a:solidFill>
@@ -8134,7 +8018,7 @@
               <a:buFont typeface="Arial"/>
               <a:buNone/>
             </a:pPr>
-            <a:endParaRPr lang="en-US" sz="1400" dirty="0" smtClean="0"/>
+            <a:endParaRPr lang="en-US" sz="1400" dirty="0"/>
           </a:p>
         </p:txBody>
       </p:sp>
@@ -8172,21 +8056,6 @@
   <p:clrMapOvr>
     <a:masterClrMapping/>
   </p:clrMapOvr>
-  <mc:AlternateContent xmlns:mc="http://schemas.openxmlformats.org/markup-compatibility/2006" xmlns:p14="http://schemas.microsoft.com/office/powerpoint/2010/main">
-    <mc:Choice Requires="p14">
-      <p:transition spd="slow" p14:dur="2000"/>
-    </mc:Choice>
-    <mc:Fallback xmlns="">
-      <p:transition xmlns:p14="http://schemas.microsoft.com/office/powerpoint/2010/main" spd="slow"/>
-    </mc:Fallback>
-  </mc:AlternateContent>
-  <p:timing>
-    <p:tnLst>
-      <p:par>
-        <p:cTn xmlns:p14="http://schemas.microsoft.com/office/powerpoint/2010/main" id="1" dur="indefinite" restart="never" nodeType="tmRoot"/>
-      </p:par>
-    </p:tnLst>
-  </p:timing>
 </p:sld>
 </file>
 
@@ -8223,7 +8092,7 @@
           <a:lstStyle/>
           <a:p>
             <a:r>
-              <a:rPr lang="en-US" dirty="0" smtClean="0"/>
+              <a:rPr lang="en-US" dirty="0"/>
               <a:t>Endpoints</a:t>
             </a:r>
             <a:endParaRPr lang="en-US" dirty="0">
@@ -8397,7 +8266,7 @@
               <a:buFont typeface="Arial"/>
               <a:buNone/>
             </a:pPr>
-            <a:endParaRPr lang="en-US" sz="1400" dirty="0" smtClean="0"/>
+            <a:endParaRPr lang="en-US" sz="1400" dirty="0"/>
           </a:p>
         </p:txBody>
       </p:sp>
@@ -8433,21 +8302,6 @@
   <p:clrMapOvr>
     <a:masterClrMapping/>
   </p:clrMapOvr>
-  <mc:AlternateContent xmlns:mc="http://schemas.openxmlformats.org/markup-compatibility/2006" xmlns:p14="http://schemas.microsoft.com/office/powerpoint/2010/main">
-    <mc:Choice Requires="p14">
-      <p:transition spd="slow" p14:dur="2000"/>
-    </mc:Choice>
-    <mc:Fallback xmlns="">
-      <p:transition xmlns:p14="http://schemas.microsoft.com/office/powerpoint/2010/main" spd="slow"/>
-    </mc:Fallback>
-  </mc:AlternateContent>
-  <p:timing>
-    <p:tnLst>
-      <p:par>
-        <p:cTn xmlns:p14="http://schemas.microsoft.com/office/powerpoint/2010/main" id="1" dur="indefinite" restart="never" nodeType="tmRoot"/>
-      </p:par>
-    </p:tnLst>
-  </p:timing>
 </p:sld>
 </file>
 
@@ -8484,7 +8338,7 @@
           <a:lstStyle/>
           <a:p>
             <a:r>
-              <a:rPr lang="en-US" dirty="0" smtClean="0"/>
+              <a:rPr lang="en-US" dirty="0"/>
               <a:t>Health Endpoint</a:t>
             </a:r>
             <a:endParaRPr lang="en-US" dirty="0">
@@ -8658,7 +8512,7 @@
               <a:buFont typeface="Arial"/>
               <a:buNone/>
             </a:pPr>
-            <a:endParaRPr lang="en-US" sz="1400" dirty="0" smtClean="0"/>
+            <a:endParaRPr lang="en-US" sz="1400" dirty="0"/>
           </a:p>
         </p:txBody>
       </p:sp>
@@ -8696,21 +8550,6 @@
   <p:clrMapOvr>
     <a:masterClrMapping/>
   </p:clrMapOvr>
-  <mc:AlternateContent xmlns:mc="http://schemas.openxmlformats.org/markup-compatibility/2006" xmlns:p14="http://schemas.microsoft.com/office/powerpoint/2010/main">
-    <mc:Choice Requires="p14">
-      <p:transition spd="slow" p14:dur="2000"/>
-    </mc:Choice>
-    <mc:Fallback xmlns="">
-      <p:transition xmlns:p14="http://schemas.microsoft.com/office/powerpoint/2010/main" spd="slow"/>
-    </mc:Fallback>
-  </mc:AlternateContent>
-  <p:timing>
-    <p:tnLst>
-      <p:par>
-        <p:cTn xmlns:p14="http://schemas.microsoft.com/office/powerpoint/2010/main" id="1" dur="indefinite" restart="never" nodeType="tmRoot"/>
-      </p:par>
-    </p:tnLst>
-  </p:timing>
 </p:sld>
 </file>
 
@@ -8747,7 +8586,7 @@
           <a:lstStyle/>
           <a:p>
             <a:r>
-              <a:rPr lang="en-US" dirty="0" smtClean="0"/>
+              <a:rPr lang="en-US" dirty="0"/>
               <a:t>Health Indicators</a:t>
             </a:r>
             <a:endParaRPr lang="en-US" dirty="0">
@@ -8921,7 +8760,7 @@
               <a:buFont typeface="Arial"/>
               <a:buNone/>
             </a:pPr>
-            <a:endParaRPr lang="en-US" sz="1400" dirty="0" smtClean="0"/>
+            <a:endParaRPr lang="en-US" sz="1400" dirty="0"/>
           </a:p>
         </p:txBody>
       </p:sp>
@@ -8950,8 +8789,20 @@
                 <a:tableStyleId>{C083E6E3-FA7D-4D7B-A595-EF9225AFEA82}</a:tableStyleId>
               </a:tblPr>
               <a:tblGrid>
-                <a:gridCol w="4399280"/>
-                <a:gridCol w="4399280"/>
+                <a:gridCol w="4399280">
+                  <a:extLst>
+                    <a:ext uri="{9D8B030D-6E8A-4147-A177-3AD203B41FA5}">
+                      <a16:colId xmlns:a16="http://schemas.microsoft.com/office/drawing/2014/main" val="20000"/>
+                    </a:ext>
+                  </a:extLst>
+                </a:gridCol>
+                <a:gridCol w="4399280">
+                  <a:extLst>
+                    <a:ext uri="{9D8B030D-6E8A-4147-A177-3AD203B41FA5}">
+                      <a16:colId xmlns:a16="http://schemas.microsoft.com/office/drawing/2014/main" val="20001"/>
+                    </a:ext>
+                  </a:extLst>
+                </a:gridCol>
               </a:tblGrid>
               <a:tr h="347122">
                 <a:tc>
@@ -8960,18 +8811,13 @@
                     <a:lstStyle/>
                     <a:p>
                       <a:r>
-                        <a:rPr lang="en-US" b="1" dirty="0" smtClean="0">
+                        <a:rPr lang="en-US" b="1" dirty="0">
                           <a:solidFill>
                             <a:schemeClr val="bg2"/>
                           </a:solidFill>
                         </a:rPr>
                         <a:t>Health Indicator	</a:t>
                       </a:r>
-                      <a:endParaRPr lang="en-US" b="1" dirty="0">
-                        <a:solidFill>
-                          <a:schemeClr val="bg2"/>
-                        </a:solidFill>
-                      </a:endParaRPr>
                     </a:p>
                   </a:txBody>
                   <a:tcPr/>
@@ -8982,7 +8828,7 @@
                     <a:lstStyle/>
                     <a:p>
                       <a:r>
-                        <a:rPr lang="en-US" dirty="0" smtClean="0">
+                        <a:rPr lang="en-US" dirty="0">
                           <a:solidFill>
                             <a:schemeClr val="bg2"/>
                           </a:solidFill>
@@ -8993,6 +8839,11 @@
                   </a:txBody>
                   <a:tcPr/>
                 </a:tc>
+                <a:extLst>
+                  <a:ext uri="{0D108BD9-81ED-4DB2-BD59-A6C34878D82A}">
+                    <a16:rowId xmlns:a16="http://schemas.microsoft.com/office/drawing/2014/main" val="10000"/>
+                  </a:ext>
+                </a:extLst>
               </a:tr>
               <a:tr h="347122">
                 <a:tc>
@@ -9001,7 +8852,7 @@
                     <a:lstStyle/>
                     <a:p>
                       <a:r>
-                        <a:rPr lang="en-US" dirty="0" err="1" smtClean="0">
+                        <a:rPr lang="en-US" dirty="0" err="1">
                           <a:solidFill>
                             <a:schemeClr val="bg2"/>
                           </a:solidFill>
@@ -9023,7 +8874,7 @@
                     <a:lstStyle/>
                     <a:p>
                       <a:r>
-                        <a:rPr lang="en-US" dirty="0" smtClean="0">
+                        <a:rPr lang="en-US" dirty="0">
                           <a:solidFill>
                             <a:schemeClr val="bg2"/>
                           </a:solidFill>
@@ -9031,7 +8882,7 @@
                         <a:t>Checks for low </a:t>
                       </a:r>
                       <a:r>
-                        <a:rPr lang="en-US" dirty="0" smtClean="0">
+                        <a:rPr lang="en-US" dirty="0">
                           <a:solidFill>
                             <a:schemeClr val="accent6"/>
                           </a:solidFill>
@@ -9039,7 +8890,7 @@
                         <a:t>Disk</a:t>
                       </a:r>
                       <a:r>
-                        <a:rPr lang="en-US" dirty="0" smtClean="0">
+                        <a:rPr lang="en-US" dirty="0">
                           <a:solidFill>
                             <a:schemeClr val="bg2"/>
                           </a:solidFill>
@@ -9050,6 +8901,11 @@
                   </a:txBody>
                   <a:tcPr/>
                 </a:tc>
+                <a:extLst>
+                  <a:ext uri="{0D108BD9-81ED-4DB2-BD59-A6C34878D82A}">
+                    <a16:rowId xmlns:a16="http://schemas.microsoft.com/office/drawing/2014/main" val="10001"/>
+                  </a:ext>
+                </a:extLst>
               </a:tr>
               <a:tr h="359578">
                 <a:tc>
@@ -9058,7 +8914,7 @@
                     <a:lstStyle/>
                     <a:p>
                       <a:r>
-                        <a:rPr lang="en-US" dirty="0" err="1" smtClean="0">
+                        <a:rPr lang="en-US" dirty="0" err="1">
                           <a:solidFill>
                             <a:schemeClr val="bg2"/>
                           </a:solidFill>
@@ -9080,7 +8936,7 @@
                     <a:lstStyle/>
                     <a:p>
                       <a:r>
-                        <a:rPr lang="en-US" dirty="0" smtClean="0">
+                        <a:rPr lang="en-US" dirty="0">
                           <a:solidFill>
                             <a:schemeClr val="bg2"/>
                           </a:solidFill>
@@ -9088,7 +8944,7 @@
                         <a:t>Check </a:t>
                       </a:r>
                       <a:r>
-                        <a:rPr lang="en-US" dirty="0" err="1" smtClean="0">
+                        <a:rPr lang="en-US" dirty="0" err="1">
                           <a:solidFill>
                             <a:srgbClr val="F79646"/>
                           </a:solidFill>
@@ -9096,7 +8952,7 @@
                         <a:t>DataSource</a:t>
                       </a:r>
                       <a:r>
-                        <a:rPr lang="en-US" dirty="0" smtClean="0">
+                        <a:rPr lang="en-US" dirty="0">
                           <a:solidFill>
                             <a:srgbClr val="F79646"/>
                           </a:solidFill>
@@ -9104,7 +8960,7 @@
                         <a:t> </a:t>
                       </a:r>
                       <a:r>
-                        <a:rPr lang="en-US" dirty="0" smtClean="0">
+                        <a:rPr lang="en-US" dirty="0">
                           <a:solidFill>
                             <a:schemeClr val="bg2"/>
                           </a:solidFill>
@@ -9115,6 +8971,11 @@
                   </a:txBody>
                   <a:tcPr/>
                 </a:tc>
+                <a:extLst>
+                  <a:ext uri="{0D108BD9-81ED-4DB2-BD59-A6C34878D82A}">
+                    <a16:rowId xmlns:a16="http://schemas.microsoft.com/office/drawing/2014/main" val="10002"/>
+                  </a:ext>
+                </a:extLst>
               </a:tr>
               <a:tr h="359578">
                 <a:tc>
@@ -9123,7 +8984,7 @@
                     <a:lstStyle/>
                     <a:p>
                       <a:r>
-                        <a:rPr lang="en-US" dirty="0" err="1" smtClean="0">
+                        <a:rPr lang="en-US" dirty="0" err="1">
                           <a:solidFill>
                             <a:schemeClr val="bg2"/>
                           </a:solidFill>
@@ -9145,7 +9006,7 @@
                     <a:lstStyle/>
                     <a:p>
                       <a:r>
-                        <a:rPr lang="en-US" dirty="0" smtClean="0">
+                        <a:rPr lang="en-US" dirty="0">
                           <a:solidFill>
                             <a:schemeClr val="bg2"/>
                           </a:solidFill>
@@ -9153,7 +9014,7 @@
                         <a:t>Checks </a:t>
                       </a:r>
                       <a:r>
-                        <a:rPr lang="en-US" dirty="0" err="1" smtClean="0">
+                        <a:rPr lang="en-US" dirty="0" err="1">
                           <a:solidFill>
                             <a:srgbClr val="F79646"/>
                           </a:solidFill>
@@ -9161,7 +9022,7 @@
                         <a:t>ElasticSearch</a:t>
                       </a:r>
                       <a:r>
-                        <a:rPr lang="en-US" dirty="0" smtClean="0">
+                        <a:rPr lang="en-US" dirty="0">
                           <a:solidFill>
                             <a:srgbClr val="F79646"/>
                           </a:solidFill>
@@ -9169,7 +9030,7 @@
                         <a:t> </a:t>
                       </a:r>
                       <a:r>
-                        <a:rPr lang="en-US" dirty="0" smtClean="0">
+                        <a:rPr lang="en-US" dirty="0">
                           <a:solidFill>
                             <a:schemeClr val="bg2"/>
                           </a:solidFill>
@@ -9180,6 +9041,11 @@
                   </a:txBody>
                   <a:tcPr/>
                 </a:tc>
+                <a:extLst>
+                  <a:ext uri="{0D108BD9-81ED-4DB2-BD59-A6C34878D82A}">
+                    <a16:rowId xmlns:a16="http://schemas.microsoft.com/office/drawing/2014/main" val="10003"/>
+                  </a:ext>
+                </a:extLst>
               </a:tr>
               <a:tr h="359578">
                 <a:tc>
@@ -9188,7 +9054,7 @@
                     <a:lstStyle/>
                     <a:p>
                       <a:r>
-                        <a:rPr lang="en-US" dirty="0" err="1" smtClean="0">
+                        <a:rPr lang="en-US" dirty="0" err="1">
                           <a:solidFill>
                             <a:schemeClr val="bg2"/>
                           </a:solidFill>
@@ -9210,7 +9076,7 @@
                     <a:lstStyle/>
                     <a:p>
                       <a:r>
-                        <a:rPr lang="en-US" dirty="0" smtClean="0">
+                        <a:rPr lang="en-US" dirty="0">
                           <a:solidFill>
                             <a:schemeClr val="bg2"/>
                           </a:solidFill>
@@ -9218,7 +9084,7 @@
                         <a:t>Checks that a </a:t>
                       </a:r>
                       <a:r>
-                        <a:rPr lang="en-US" dirty="0" smtClean="0">
+                        <a:rPr lang="en-US" dirty="0">
                           <a:solidFill>
                             <a:srgbClr val="F79646"/>
                           </a:solidFill>
@@ -9226,7 +9092,7 @@
                         <a:t>JMS</a:t>
                       </a:r>
                       <a:r>
-                        <a:rPr lang="en-US" dirty="0" smtClean="0">
+                        <a:rPr lang="en-US" dirty="0">
                           <a:solidFill>
                             <a:schemeClr val="bg2"/>
                           </a:solidFill>
@@ -9237,6 +9103,11 @@
                   </a:txBody>
                   <a:tcPr/>
                 </a:tc>
+                <a:extLst>
+                  <a:ext uri="{0D108BD9-81ED-4DB2-BD59-A6C34878D82A}">
+                    <a16:rowId xmlns:a16="http://schemas.microsoft.com/office/drawing/2014/main" val="10004"/>
+                  </a:ext>
+                </a:extLst>
               </a:tr>
               <a:tr h="359578">
                 <a:tc>
@@ -9245,7 +9116,7 @@
                     <a:lstStyle/>
                     <a:p>
                       <a:r>
-                        <a:rPr lang="en-US" dirty="0" err="1" smtClean="0">
+                        <a:rPr lang="en-US" dirty="0" err="1">
                           <a:solidFill>
                             <a:schemeClr val="bg2"/>
                           </a:solidFill>
@@ -9267,7 +9138,7 @@
                     <a:lstStyle/>
                     <a:p>
                       <a:r>
-                        <a:rPr lang="en-US" dirty="0" smtClean="0">
+                        <a:rPr lang="en-US" dirty="0">
                           <a:solidFill>
                             <a:schemeClr val="bg2"/>
                           </a:solidFill>
@@ -9275,7 +9146,7 @@
                         <a:t>Checks that a </a:t>
                       </a:r>
                       <a:r>
-                        <a:rPr lang="en-US" dirty="0" smtClean="0">
+                        <a:rPr lang="en-US" dirty="0">
                           <a:solidFill>
                             <a:srgbClr val="F79646"/>
                           </a:solidFill>
@@ -9283,7 +9154,7 @@
                         <a:t>mail</a:t>
                       </a:r>
                       <a:r>
-                        <a:rPr lang="en-US" dirty="0" smtClean="0">
+                        <a:rPr lang="en-US" dirty="0">
                           <a:solidFill>
                             <a:schemeClr val="bg2"/>
                           </a:solidFill>
@@ -9294,6 +9165,11 @@
                   </a:txBody>
                   <a:tcPr/>
                 </a:tc>
+                <a:extLst>
+                  <a:ext uri="{0D108BD9-81ED-4DB2-BD59-A6C34878D82A}">
+                    <a16:rowId xmlns:a16="http://schemas.microsoft.com/office/drawing/2014/main" val="10005"/>
+                  </a:ext>
+                </a:extLst>
               </a:tr>
               <a:tr h="359578">
                 <a:tc>
@@ -9302,7 +9178,7 @@
                     <a:lstStyle/>
                     <a:p>
                       <a:r>
-                        <a:rPr lang="en-US" dirty="0" err="1" smtClean="0">
+                        <a:rPr lang="en-US" dirty="0" err="1">
                           <a:solidFill>
                             <a:schemeClr val="bg2"/>
                           </a:solidFill>
@@ -9324,7 +9200,7 @@
                     <a:lstStyle/>
                     <a:p>
                       <a:r>
-                        <a:rPr lang="en-US" dirty="0" err="1" smtClean="0">
+                        <a:rPr lang="en-US" dirty="0" err="1">
                           <a:solidFill>
                             <a:schemeClr val="bg2"/>
                           </a:solidFill>
@@ -9332,7 +9208,7 @@
                         <a:t>Cheks</a:t>
                       </a:r>
                       <a:r>
-                        <a:rPr lang="en-US" dirty="0" smtClean="0">
+                        <a:rPr lang="en-US" dirty="0">
                           <a:solidFill>
                             <a:schemeClr val="bg2"/>
                           </a:solidFill>
@@ -9340,7 +9216,7 @@
                         <a:t> that a </a:t>
                       </a:r>
                       <a:r>
-                        <a:rPr lang="en-US" dirty="0" smtClean="0">
+                        <a:rPr lang="en-US" dirty="0">
                           <a:solidFill>
                             <a:srgbClr val="F79646"/>
                           </a:solidFill>
@@ -9348,7 +9224,7 @@
                         <a:t>Mongo</a:t>
                       </a:r>
                       <a:r>
-                        <a:rPr lang="en-US" dirty="0" smtClean="0">
+                        <a:rPr lang="en-US" dirty="0">
                           <a:solidFill>
                             <a:schemeClr val="bg2"/>
                           </a:solidFill>
@@ -9359,6 +9235,11 @@
                   </a:txBody>
                   <a:tcPr/>
                 </a:tc>
+                <a:extLst>
+                  <a:ext uri="{0D108BD9-81ED-4DB2-BD59-A6C34878D82A}">
+                    <a16:rowId xmlns:a16="http://schemas.microsoft.com/office/drawing/2014/main" val="10006"/>
+                  </a:ext>
+                </a:extLst>
               </a:tr>
               <a:tr h="359578">
                 <a:tc>
@@ -9367,7 +9248,7 @@
                     <a:lstStyle/>
                     <a:p>
                       <a:r>
-                        <a:rPr lang="en-US" dirty="0" err="1" smtClean="0">
+                        <a:rPr lang="en-US" dirty="0" err="1">
                           <a:solidFill>
                             <a:schemeClr val="bg2"/>
                           </a:solidFill>
@@ -9389,7 +9270,7 @@
                     <a:lstStyle/>
                     <a:p>
                       <a:r>
-                        <a:rPr lang="en-US" dirty="0" smtClean="0">
+                        <a:rPr lang="en-US" dirty="0">
                           <a:solidFill>
                             <a:schemeClr val="bg2"/>
                           </a:solidFill>
@@ -9397,7 +9278,7 @@
                         <a:t>Checks that a </a:t>
                       </a:r>
                       <a:r>
-                        <a:rPr lang="en-US" dirty="0" smtClean="0">
+                        <a:rPr lang="en-US" dirty="0">
                           <a:solidFill>
                             <a:srgbClr val="F79646"/>
                           </a:solidFill>
@@ -9405,7 +9286,7 @@
                         <a:t>Rabbit</a:t>
                       </a:r>
                       <a:r>
-                        <a:rPr lang="en-US" dirty="0" smtClean="0">
+                        <a:rPr lang="en-US" dirty="0">
                           <a:solidFill>
                             <a:schemeClr val="bg2"/>
                           </a:solidFill>
@@ -9416,6 +9297,11 @@
                   </a:txBody>
                   <a:tcPr/>
                 </a:tc>
+                <a:extLst>
+                  <a:ext uri="{0D108BD9-81ED-4DB2-BD59-A6C34878D82A}">
+                    <a16:rowId xmlns:a16="http://schemas.microsoft.com/office/drawing/2014/main" val="10007"/>
+                  </a:ext>
+                </a:extLst>
               </a:tr>
               <a:tr h="359578">
                 <a:tc>
@@ -9424,7 +9310,7 @@
                     <a:lstStyle/>
                     <a:p>
                       <a:r>
-                        <a:rPr lang="en-US" dirty="0" err="1" smtClean="0">
+                        <a:rPr lang="en-US" dirty="0" err="1">
                           <a:solidFill>
                             <a:schemeClr val="bg2"/>
                           </a:solidFill>
@@ -9446,7 +9332,7 @@
                     <a:lstStyle/>
                     <a:p>
                       <a:r>
-                        <a:rPr lang="en-US" dirty="0" smtClean="0">
+                        <a:rPr lang="en-US" dirty="0">
                           <a:solidFill>
                             <a:schemeClr val="bg2"/>
                           </a:solidFill>
@@ -9454,7 +9340,7 @@
                         <a:t>Checks that a </a:t>
                       </a:r>
                       <a:r>
-                        <a:rPr lang="en-US" dirty="0" err="1" smtClean="0">
+                        <a:rPr lang="en-US" dirty="0" err="1">
                           <a:solidFill>
                             <a:srgbClr val="F79646"/>
                           </a:solidFill>
@@ -9462,7 +9348,7 @@
                         <a:t>Redis</a:t>
                       </a:r>
                       <a:r>
-                        <a:rPr lang="en-US" dirty="0" smtClean="0">
+                        <a:rPr lang="en-US" dirty="0">
                           <a:solidFill>
                             <a:srgbClr val="F79646"/>
                           </a:solidFill>
@@ -9470,7 +9356,7 @@
                         <a:t> </a:t>
                       </a:r>
                       <a:r>
-                        <a:rPr lang="en-US" dirty="0" smtClean="0">
+                        <a:rPr lang="en-US" dirty="0">
                           <a:solidFill>
                             <a:schemeClr val="bg2"/>
                           </a:solidFill>
@@ -9481,6 +9367,11 @@
                   </a:txBody>
                   <a:tcPr/>
                 </a:tc>
+                <a:extLst>
+                  <a:ext uri="{0D108BD9-81ED-4DB2-BD59-A6C34878D82A}">
+                    <a16:rowId xmlns:a16="http://schemas.microsoft.com/office/drawing/2014/main" val="10008"/>
+                  </a:ext>
+                </a:extLst>
               </a:tr>
               <a:tr h="359578">
                 <a:tc>
@@ -9489,7 +9380,7 @@
                     <a:lstStyle/>
                     <a:p>
                       <a:r>
-                        <a:rPr lang="en-US" dirty="0" err="1" smtClean="0">
+                        <a:rPr lang="en-US" dirty="0" err="1">
                           <a:solidFill>
                             <a:schemeClr val="bg2"/>
                           </a:solidFill>
@@ -9511,7 +9402,7 @@
                     <a:lstStyle/>
                     <a:p>
                       <a:r>
-                        <a:rPr lang="en-US" dirty="0" smtClean="0">
+                        <a:rPr lang="en-US" dirty="0">
                           <a:solidFill>
                             <a:schemeClr val="bg2"/>
                           </a:solidFill>
@@ -9519,7 +9410,7 @@
                         <a:t>Checks that a </a:t>
                       </a:r>
                       <a:r>
-                        <a:rPr lang="en-US" dirty="0" err="1" smtClean="0">
+                        <a:rPr lang="en-US" dirty="0" err="1">
                           <a:solidFill>
                             <a:srgbClr val="F79646"/>
                           </a:solidFill>
@@ -9527,7 +9418,7 @@
                         <a:t>Solr</a:t>
                       </a:r>
                       <a:r>
-                        <a:rPr lang="en-US" dirty="0" smtClean="0">
+                        <a:rPr lang="en-US" dirty="0">
                           <a:solidFill>
                             <a:srgbClr val="F79646"/>
                           </a:solidFill>
@@ -9535,7 +9426,7 @@
                         <a:t> </a:t>
                       </a:r>
                       <a:r>
-                        <a:rPr lang="en-US" dirty="0" smtClean="0">
+                        <a:rPr lang="en-US" dirty="0">
                           <a:solidFill>
                             <a:schemeClr val="bg2"/>
                           </a:solidFill>
@@ -9546,6 +9437,11 @@
                   </a:txBody>
                   <a:tcPr/>
                 </a:tc>
+                <a:extLst>
+                  <a:ext uri="{0D108BD9-81ED-4DB2-BD59-A6C34878D82A}">
+                    <a16:rowId xmlns:a16="http://schemas.microsoft.com/office/drawing/2014/main" val="10009"/>
+                  </a:ext>
+                </a:extLst>
               </a:tr>
             </a:tbl>
           </a:graphicData>
@@ -9561,21 +9457,6 @@
   <p:clrMapOvr>
     <a:masterClrMapping/>
   </p:clrMapOvr>
-  <mc:AlternateContent xmlns:mc="http://schemas.openxmlformats.org/markup-compatibility/2006" xmlns:p14="http://schemas.microsoft.com/office/powerpoint/2010/main">
-    <mc:Choice Requires="p14">
-      <p:transition spd="slow" p14:dur="2000"/>
-    </mc:Choice>
-    <mc:Fallback xmlns="">
-      <p:transition xmlns:p14="http://schemas.microsoft.com/office/powerpoint/2010/main" spd="slow"/>
-    </mc:Fallback>
-  </mc:AlternateContent>
-  <p:timing>
-    <p:tnLst>
-      <p:par>
-        <p:cTn xmlns:p14="http://schemas.microsoft.com/office/powerpoint/2010/main" id="1" dur="indefinite" restart="never" nodeType="tmRoot"/>
-      </p:par>
-    </p:tnLst>
-  </p:timing>
 </p:sld>
 </file>
 
@@ -9612,7 +9493,7 @@
           <a:lstStyle/>
           <a:p>
             <a:r>
-              <a:rPr lang="en-US" dirty="0" smtClean="0"/>
+              <a:rPr lang="en-US" dirty="0"/>
               <a:t>HTTP Access</a:t>
             </a:r>
             <a:endParaRPr lang="en-US" dirty="0">
@@ -9649,7 +9530,7 @@
               <a:buNone/>
             </a:pPr>
             <a:r>
-              <a:rPr lang="en-US" sz="1400" dirty="0" smtClean="0"/>
+              <a:rPr lang="en-US" sz="1400" dirty="0"/>
               <a:t>Importing Spring Security Dependency</a:t>
             </a:r>
           </a:p>
@@ -9667,7 +9548,7 @@
             <a:pPr marL="0" indent="0">
               <a:buNone/>
             </a:pPr>
-            <a:endParaRPr lang="en-US" sz="1400" b="1" i="1" u="sng" dirty="0" smtClean="0">
+            <a:endParaRPr lang="en-US" sz="1400" b="1" i="1" u="sng" dirty="0">
               <a:solidFill>
                 <a:srgbClr val="FFFFFF"/>
               </a:solidFill>
@@ -9687,7 +9568,7 @@
             <a:pPr marL="0" indent="0">
               <a:buNone/>
             </a:pPr>
-            <a:endParaRPr lang="en-US" sz="1400" b="1" i="1" u="sng" dirty="0" smtClean="0">
+            <a:endParaRPr lang="en-US" sz="1400" b="1" i="1" u="sng" dirty="0">
               <a:solidFill>
                 <a:srgbClr val="FFFFFF"/>
               </a:solidFill>
@@ -9708,7 +9589,7 @@
               <a:buNone/>
             </a:pPr>
             <a:r>
-              <a:rPr lang="en-US" sz="1400" dirty="0" smtClean="0">
+              <a:rPr lang="en-US" sz="1400" dirty="0">
                 <a:solidFill>
                   <a:srgbClr val="FFFFFF"/>
                 </a:solidFill>
@@ -9730,7 +9611,7 @@
             <a:pPr marL="0" indent="0">
               <a:buNone/>
             </a:pPr>
-            <a:endParaRPr lang="en-US" sz="1400" dirty="0" smtClean="0">
+            <a:endParaRPr lang="en-US" sz="1400" dirty="0">
               <a:solidFill>
                 <a:srgbClr val="FFFFFF"/>
               </a:solidFill>
@@ -9750,7 +9631,7 @@
             <a:pPr marL="0" indent="0">
               <a:buNone/>
             </a:pPr>
-            <a:endParaRPr lang="en-US" sz="1400" dirty="0" smtClean="0"/>
+            <a:endParaRPr lang="en-US" sz="1400" dirty="0"/>
           </a:p>
         </p:txBody>
       </p:sp>
@@ -9917,7 +9798,7 @@
               <a:buFont typeface="Arial"/>
               <a:buNone/>
             </a:pPr>
-            <a:endParaRPr lang="en-US" sz="1400" dirty="0" smtClean="0"/>
+            <a:endParaRPr lang="en-US" sz="1400" dirty="0"/>
           </a:p>
         </p:txBody>
       </p:sp>
@@ -9979,21 +9860,6 @@
   <p:clrMapOvr>
     <a:masterClrMapping/>
   </p:clrMapOvr>
-  <mc:AlternateContent xmlns:mc="http://schemas.openxmlformats.org/markup-compatibility/2006" xmlns:p14="http://schemas.microsoft.com/office/powerpoint/2010/main">
-    <mc:Choice Requires="p14">
-      <p:transition spd="slow" p14:dur="2000"/>
-    </mc:Choice>
-    <mc:Fallback xmlns="">
-      <p:transition xmlns:p14="http://schemas.microsoft.com/office/powerpoint/2010/main" spd="slow"/>
-    </mc:Fallback>
-  </mc:AlternateContent>
-  <p:timing>
-    <p:tnLst>
-      <p:par>
-        <p:cTn xmlns:p14="http://schemas.microsoft.com/office/powerpoint/2010/main" id="1" dur="indefinite" restart="never" nodeType="tmRoot"/>
-      </p:par>
-    </p:tnLst>
-  </p:timing>
 </p:sld>
 </file>
 
@@ -10030,7 +9896,7 @@
           <a:lstStyle/>
           <a:p>
             <a:r>
-              <a:rPr lang="en-US" dirty="0" smtClean="0"/>
+              <a:rPr lang="en-US" dirty="0"/>
               <a:t>Metrics</a:t>
             </a:r>
             <a:endParaRPr lang="en-US" dirty="0">
@@ -10067,7 +9933,7 @@
               <a:buNone/>
             </a:pPr>
             <a:r>
-              <a:rPr lang="en-US" sz="1400" dirty="0" smtClean="0"/>
+              <a:rPr lang="en-US" sz="1400" dirty="0"/>
               <a:t>Spring Boot Actuator includes a metrics service with ‘gauge’ and ‘counter support</a:t>
             </a:r>
           </a:p>
@@ -10236,7 +10102,7 @@
               <a:buFont typeface="Arial"/>
               <a:buNone/>
             </a:pPr>
-            <a:endParaRPr lang="en-US" sz="1400" dirty="0" smtClean="0"/>
+            <a:endParaRPr lang="en-US" sz="1400" dirty="0"/>
           </a:p>
         </p:txBody>
       </p:sp>
@@ -10503,18 +10369,10 @@
   <p:clrMapOvr>
     <a:masterClrMapping/>
   </p:clrMapOvr>
-  <mc:AlternateContent xmlns:mc="http://schemas.openxmlformats.org/markup-compatibility/2006" xmlns:p14="http://schemas.microsoft.com/office/powerpoint/2010/main">
-    <mc:Choice Requires="p14">
-      <p:transition spd="slow" p14:dur="2000"/>
-    </mc:Choice>
-    <mc:Fallback xmlns="">
-      <p:transition xmlns:p14="http://schemas.microsoft.com/office/powerpoint/2010/main" spd="slow"/>
-    </mc:Fallback>
-  </mc:AlternateContent>
   <p:timing>
     <p:tnLst>
       <p:par>
-        <p:cTn xmlns:p14="http://schemas.microsoft.com/office/powerpoint/2010/main" id="1" dur="indefinite" restart="never" nodeType="tmRoot">
+        <p:cTn id="1" dur="indefinite" restart="never" nodeType="tmRoot">
           <p:childTnLst>
             <p:seq concurrent="1" nextAc="seek">
               <p:cTn id="2" dur="indefinite" nodeType="mainSeq">
@@ -10857,7 +10715,7 @@
           <a:lstStyle/>
           <a:p>
             <a:r>
-              <a:rPr lang="en-US" dirty="0" smtClean="0"/>
+              <a:rPr lang="en-US" dirty="0"/>
               <a:t>Profiles</a:t>
             </a:r>
             <a:endParaRPr lang="en-US" dirty="0">
@@ -10904,12 +10762,6 @@
               </a:rPr>
               <a:t>YAML file can contain for several documents </a:t>
             </a:r>
-            <a:endParaRPr lang="en-US" sz="1400" dirty="0" smtClean="0">
-              <a:solidFill>
-                <a:srgbClr val="EEECE1"/>
-              </a:solidFill>
-              <a:sym typeface="Arial"/>
-            </a:endParaRPr>
           </a:p>
           <a:p>
             <a:pPr>
@@ -10952,12 +10804,6 @@
               </a:rPr>
               <a:t>Convenient to specify alternate configurations in the same file </a:t>
             </a:r>
-            <a:endParaRPr lang="en-US" sz="1400" dirty="0" smtClean="0">
-              <a:solidFill>
-                <a:srgbClr val="EEECE1"/>
-              </a:solidFill>
-              <a:sym typeface="Arial"/>
-            </a:endParaRPr>
           </a:p>
           <a:p>
             <a:pPr>
@@ -10965,7 +10811,7 @@
                 <a:srgbClr val="008774"/>
               </a:buClr>
             </a:pPr>
-            <a:endParaRPr lang="en-US" sz="1400" dirty="0" smtClean="0">
+            <a:endParaRPr lang="en-US" sz="1400" dirty="0">
               <a:solidFill>
                 <a:srgbClr val="EEECE1"/>
               </a:solidFill>
@@ -10979,7 +10825,7 @@
               </a:buClr>
             </a:pPr>
             <a:r>
-              <a:rPr lang="en-US" sz="1400" dirty="0" smtClean="0">
+              <a:rPr lang="en-US" sz="1400" dirty="0">
                 <a:solidFill>
                   <a:srgbClr val="EEECE1"/>
                 </a:solidFill>
@@ -10987,12 +10833,6 @@
               </a:rPr>
               <a:t>Set the active profile</a:t>
             </a:r>
-            <a:endParaRPr lang="en-US" sz="1400" dirty="0">
-              <a:solidFill>
-                <a:srgbClr val="EEECE1"/>
-              </a:solidFill>
-              <a:sym typeface="Arial"/>
-            </a:endParaRPr>
           </a:p>
           <a:p>
             <a:pPr marL="0" indent="0">
@@ -11001,7 +10841,7 @@
               </a:buClr>
               <a:buNone/>
             </a:pPr>
-            <a:endParaRPr lang="en-US" sz="1050" dirty="0" smtClean="0">
+            <a:endParaRPr lang="en-US" sz="1050" dirty="0">
               <a:solidFill>
                 <a:srgbClr val="EEECE1"/>
               </a:solidFill>
@@ -11016,31 +10856,13 @@
               <a:buNone/>
             </a:pPr>
             <a:r>
-              <a:rPr lang="en-US" sz="1200" dirty="0" smtClean="0">
+              <a:rPr lang="en-US" sz="1200" dirty="0">
                 <a:solidFill>
                   <a:srgbClr val="EEECE1"/>
                 </a:solidFill>
                 <a:sym typeface="Arial"/>
               </a:rPr>
-              <a:t>SPRING_PROFILES_ACTIVE</a:t>
-            </a:r>
-            <a:r>
-              <a:rPr lang="en-US" sz="1200" dirty="0">
-                <a:solidFill>
-                  <a:srgbClr val="EEECE1"/>
-                </a:solidFill>
-                <a:sym typeface="Arial"/>
-              </a:rPr>
-              <a:t>=</a:t>
-            </a:r>
-            <a:r>
-              <a:rPr lang="en-US" sz="1200" dirty="0" smtClean="0">
-                <a:solidFill>
-                  <a:srgbClr val="EEECE1"/>
-                </a:solidFill>
-                <a:sym typeface="Arial"/>
-              </a:rPr>
-              <a:t>production</a:t>
+              <a:t>SPRING_PROFILES_ACTIVE=production</a:t>
             </a:r>
           </a:p>
           <a:p>
@@ -11071,16 +10893,7 @@
                 </a:solidFill>
                 <a:sym typeface="Arial"/>
               </a:rPr>
-              <a:t> </a:t>
-            </a:r>
-            <a:r>
-              <a:rPr lang="en-US" sz="1200" dirty="0" smtClean="0">
-                <a:solidFill>
-                  <a:srgbClr val="EEECE1"/>
-                </a:solidFill>
-                <a:sym typeface="Arial"/>
-              </a:rPr>
-              <a:t>    or</a:t>
+              <a:t>     or</a:t>
             </a:r>
           </a:p>
           <a:p>
@@ -11090,7 +10903,7 @@
               </a:buClr>
               <a:buNone/>
             </a:pPr>
-            <a:endParaRPr lang="en-US" sz="1200" dirty="0" smtClean="0">
+            <a:endParaRPr lang="en-US" sz="1200" dirty="0">
               <a:solidFill>
                 <a:srgbClr val="EEECE1"/>
               </a:solidFill>
@@ -11315,7 +11128,7 @@
               <a:buFont typeface="Arial"/>
               <a:buNone/>
             </a:pPr>
-            <a:endParaRPr lang="en-US" sz="1400" dirty="0" smtClean="0"/>
+            <a:endParaRPr lang="en-US" sz="1400" dirty="0"/>
           </a:p>
         </p:txBody>
       </p:sp>
@@ -11584,7 +11397,7 @@
               <a:buNone/>
             </a:pPr>
             <a:r>
-              <a:rPr lang="en-US" sz="1400" dirty="0" smtClean="0"/>
+              <a:rPr lang="en-US" sz="1400" dirty="0"/>
               <a:t>Development profile</a:t>
             </a:r>
           </a:p>
@@ -11757,7 +11570,7 @@
               <a:buNone/>
             </a:pPr>
             <a:r>
-              <a:rPr lang="en-US" sz="1400" dirty="0" smtClean="0"/>
+              <a:rPr lang="en-US" sz="1400" dirty="0"/>
               <a:t>Production profile</a:t>
             </a:r>
           </a:p>
@@ -11821,21 +11634,6 @@
   <p:clrMapOvr>
     <a:masterClrMapping/>
   </p:clrMapOvr>
-  <mc:AlternateContent xmlns:mc="http://schemas.openxmlformats.org/markup-compatibility/2006" xmlns:p14="http://schemas.microsoft.com/office/powerpoint/2010/main">
-    <mc:Choice Requires="p14">
-      <p:transition spd="slow" p14:dur="2000"/>
-    </mc:Choice>
-    <mc:Fallback xmlns="">
-      <p:transition xmlns:p14="http://schemas.microsoft.com/office/powerpoint/2010/main" spd="slow"/>
-    </mc:Fallback>
-  </mc:AlternateContent>
-  <p:timing>
-    <p:tnLst>
-      <p:par>
-        <p:cTn xmlns:p14="http://schemas.microsoft.com/office/powerpoint/2010/main" id="1" dur="indefinite" restart="never" nodeType="tmRoot"/>
-      </p:par>
-    </p:tnLst>
-  </p:timing>
 </p:sld>
 </file>
 
@@ -12183,14 +11981,6 @@
             <a:pPr algn="ctr">
               <a:buSzPct val="25000"/>
             </a:pPr>
-            <a:r>
-              <a:rPr lang="en-US" cap="all" dirty="0" smtClean="0">
-                <a:solidFill>
-                  <a:srgbClr val="74CEC7"/>
-                </a:solidFill>
-              </a:rPr>
-              <a:t>Lab</a:t>
-            </a:r>
             <a:endParaRPr lang="en" sz="2100" cap="all" dirty="0">
               <a:solidFill>
                 <a:srgbClr val="74CEC7"/>
@@ -12209,21 +11999,6 @@
   <p:clrMapOvr>
     <a:masterClrMapping/>
   </p:clrMapOvr>
-  <mc:AlternateContent xmlns:mc="http://schemas.openxmlformats.org/markup-compatibility/2006" xmlns:p14="http://schemas.microsoft.com/office/powerpoint/2010/main">
-    <mc:Choice Requires="p14">
-      <p:transition p14:dur="0"/>
-    </mc:Choice>
-    <mc:Fallback xmlns="">
-      <p:transition xmlns:p14="http://schemas.microsoft.com/office/powerpoint/2010/main"/>
-    </mc:Fallback>
-  </mc:AlternateContent>
-  <p:timing>
-    <p:tnLst>
-      <p:par>
-        <p:cTn xmlns:p14="http://schemas.microsoft.com/office/powerpoint/2010/main" id="1" dur="indefinite" restart="never" nodeType="tmRoot"/>
-      </p:par>
-    </p:tnLst>
-  </p:timing>
 </p:sld>
 </file>
 

</xml_diff>